<commit_message>
docs: remove old slide
</commit_message>
<xml_diff>
--- a/docs/Mad-Mints.pptx
+++ b/docs/Mad-Mints.pptx
@@ -5,7 +5,7 @@
     <p:sldMasterId id="2147483672" r:id="rId1"/>
   </p:sldMasterIdLst>
   <p:notesMasterIdLst>
-    <p:notesMasterId r:id="rId13"/>
+    <p:notesMasterId r:id="rId12"/>
   </p:notesMasterIdLst>
   <p:sldIdLst>
     <p:sldId id="321" r:id="rId2"/>
@@ -14,11 +14,10 @@
     <p:sldId id="333" r:id="rId5"/>
     <p:sldId id="332" r:id="rId6"/>
     <p:sldId id="334" r:id="rId7"/>
-    <p:sldId id="328" r:id="rId8"/>
-    <p:sldId id="325" r:id="rId9"/>
-    <p:sldId id="329" r:id="rId10"/>
-    <p:sldId id="326" r:id="rId11"/>
-    <p:sldId id="327" r:id="rId12"/>
+    <p:sldId id="325" r:id="rId8"/>
+    <p:sldId id="329" r:id="rId9"/>
+    <p:sldId id="326" r:id="rId10"/>
+    <p:sldId id="327" r:id="rId11"/>
   </p:sldIdLst>
   <p:sldSz cx="12192000" cy="6858000"/>
   <p:notesSz cx="6858000" cy="9144000"/>
@@ -4320,242 +4319,6 @@
           <p:cNvPr id="2" name="タイトル 1">
             <a:extLst>
               <a:ext uri="{FF2B5EF4-FFF2-40B4-BE49-F238E27FC236}">
-                <a16:creationId xmlns:a16="http://schemas.microsoft.com/office/drawing/2014/main" id="{90FD3E59-428E-D6B2-B3C5-F6F7B480123B}"/>
-              </a:ext>
-            </a:extLst>
-          </p:cNvPr>
-          <p:cNvSpPr>
-            <a:spLocks noGrp="1"/>
-          </p:cNvSpPr>
-          <p:nvPr>
-            <p:ph type="title"/>
-          </p:nvPr>
-        </p:nvSpPr>
-        <p:spPr/>
-        <p:txBody>
-          <a:bodyPr/>
-          <a:lstStyle/>
-          <a:p>
-            <a:r>
-              <a:rPr kumimoji="1" lang="en-US" altLang="ja-JP" dirty="0"/>
-              <a:t>Example Code</a:t>
-            </a:r>
-            <a:endParaRPr kumimoji="1" lang="ja-JP" altLang="en-US"/>
-          </a:p>
-        </p:txBody>
-      </p:sp>
-      <p:sp>
-        <p:nvSpPr>
-          <p:cNvPr id="4" name="フッター プレースホルダー 3">
-            <a:extLst>
-              <a:ext uri="{FF2B5EF4-FFF2-40B4-BE49-F238E27FC236}">
-                <a16:creationId xmlns:a16="http://schemas.microsoft.com/office/drawing/2014/main" id="{84F8FC5D-67C5-EB08-DA8F-DC43154573F5}"/>
-              </a:ext>
-            </a:extLst>
-          </p:cNvPr>
-          <p:cNvSpPr>
-            <a:spLocks noGrp="1"/>
-          </p:cNvSpPr>
-          <p:nvPr>
-            <p:ph type="ftr" sz="quarter" idx="11"/>
-          </p:nvPr>
-        </p:nvSpPr>
-        <p:spPr/>
-        <p:txBody>
-          <a:bodyPr/>
-          <a:lstStyle/>
-          <a:p>
-            <a:r>
-              <a:rPr kumimoji="1" lang="en-US" altLang="ja-JP"/>
-              <a:t>256hax</a:t>
-            </a:r>
-            <a:endParaRPr kumimoji="1" lang="ja-JP" altLang="en-US"/>
-          </a:p>
-        </p:txBody>
-      </p:sp>
-      <p:sp>
-        <p:nvSpPr>
-          <p:cNvPr id="5" name="スライド番号プレースホルダー 4">
-            <a:extLst>
-              <a:ext uri="{FF2B5EF4-FFF2-40B4-BE49-F238E27FC236}">
-                <a16:creationId xmlns:a16="http://schemas.microsoft.com/office/drawing/2014/main" id="{9810586D-71D7-C56A-D81E-323600AAE558}"/>
-              </a:ext>
-            </a:extLst>
-          </p:cNvPr>
-          <p:cNvSpPr>
-            <a:spLocks noGrp="1"/>
-          </p:cNvSpPr>
-          <p:nvPr>
-            <p:ph type="sldNum" sz="quarter" idx="12"/>
-          </p:nvPr>
-        </p:nvSpPr>
-        <p:spPr/>
-        <p:txBody>
-          <a:bodyPr/>
-          <a:lstStyle/>
-          <a:p>
-            <a:fld id="{51BE5F08-58E8-9243-A834-2B76637F595D}" type="slidenum">
-              <a:rPr kumimoji="1" lang="ja-JP" altLang="en-US" smtClean="0"/>
-              <a:pPr/>
-              <a:t>9</a:t>
-            </a:fld>
-            <a:endParaRPr kumimoji="1" lang="ja-JP" altLang="en-US"/>
-          </a:p>
-        </p:txBody>
-      </p:sp>
-      <p:sp>
-        <p:nvSpPr>
-          <p:cNvPr id="8" name="テキスト ボックス 7">
-            <a:extLst>
-              <a:ext uri="{FF2B5EF4-FFF2-40B4-BE49-F238E27FC236}">
-                <a16:creationId xmlns:a16="http://schemas.microsoft.com/office/drawing/2014/main" id="{F6E10048-C70B-798B-1A63-B0DE8166ED8A}"/>
-              </a:ext>
-            </a:extLst>
-          </p:cNvPr>
-          <p:cNvSpPr txBox="1"/>
-          <p:nvPr/>
-        </p:nvSpPr>
-        <p:spPr>
-          <a:xfrm>
-            <a:off x="838200" y="1853765"/>
-            <a:ext cx="10515600" cy="1118035"/>
-          </a:xfrm>
-          <a:prstGeom prst="rect">
-            <a:avLst/>
-          </a:prstGeom>
-          <a:noFill/>
-        </p:spPr>
-        <p:txBody>
-          <a:bodyPr wrap="square" rtlCol="0">
-            <a:noAutofit/>
-          </a:bodyPr>
-          <a:lstStyle/>
-          <a:p>
-            <a:pPr algn="ctr"/>
-            <a:r>
-              <a:rPr kumimoji="1" lang="en-US" altLang="ja-JP" sz="2000" dirty="0">
-                <a:hlinkClick r:id="rId2"/>
-              </a:rPr>
-              <a:t>https://github.com/256hax/mad-mints</a:t>
-            </a:r>
-            <a:endParaRPr kumimoji="1" lang="en-US" altLang="ja-JP" sz="2000" dirty="0"/>
-          </a:p>
-          <a:p>
-            <a:pPr algn="ctr"/>
-            <a:endParaRPr kumimoji="1" lang="en-US" altLang="ja-JP" sz="2000" dirty="0"/>
-          </a:p>
-          <a:p>
-            <a:pPr algn="ctr"/>
-            <a:r>
-              <a:rPr kumimoji="1" lang="en-US" altLang="ja-JP" sz="2000" dirty="0"/>
-              <a:t>Experiment purpose only.</a:t>
-            </a:r>
-            <a:endParaRPr kumimoji="1" lang="ja-JP" altLang="en-US" sz="2000" dirty="0"/>
-          </a:p>
-        </p:txBody>
-      </p:sp>
-      <p:pic>
-        <p:nvPicPr>
-          <p:cNvPr id="12" name="図 11">
-            <a:extLst>
-              <a:ext uri="{FF2B5EF4-FFF2-40B4-BE49-F238E27FC236}">
-                <a16:creationId xmlns:a16="http://schemas.microsoft.com/office/drawing/2014/main" id="{30DEEAB5-885C-A99D-ADA6-A773ECBE110B}"/>
-              </a:ext>
-            </a:extLst>
-          </p:cNvPr>
-          <p:cNvPicPr>
-            <a:picLocks noChangeAspect="1"/>
-          </p:cNvPicPr>
-          <p:nvPr/>
-        </p:nvPicPr>
-        <p:blipFill>
-          <a:blip r:embed="rId3"/>
-          <a:stretch>
-            <a:fillRect/>
-          </a:stretch>
-        </p:blipFill>
-        <p:spPr>
-          <a:xfrm>
-            <a:off x="4667250" y="2971800"/>
-            <a:ext cx="2857500" cy="2857500"/>
-          </a:xfrm>
-          <a:prstGeom prst="rect">
-            <a:avLst/>
-          </a:prstGeom>
-        </p:spPr>
-      </p:pic>
-      <p:sp>
-        <p:nvSpPr>
-          <p:cNvPr id="3" name="テキスト ボックス 2">
-            <a:extLst>
-              <a:ext uri="{FF2B5EF4-FFF2-40B4-BE49-F238E27FC236}">
-                <a16:creationId xmlns:a16="http://schemas.microsoft.com/office/drawing/2014/main" id="{AE19384B-A3A9-6882-17B9-02D91620C991}"/>
-              </a:ext>
-            </a:extLst>
-          </p:cNvPr>
-          <p:cNvSpPr txBox="1"/>
-          <p:nvPr/>
-        </p:nvSpPr>
-        <p:spPr>
-          <a:xfrm>
-            <a:off x="10729139" y="9225"/>
-            <a:ext cx="1443600" cy="315912"/>
-          </a:xfrm>
-          <a:prstGeom prst="rect">
-            <a:avLst/>
-          </a:prstGeom>
-          <a:noFill/>
-        </p:spPr>
-        <p:txBody>
-          <a:bodyPr wrap="square" rtlCol="0">
-            <a:noAutofit/>
-          </a:bodyPr>
-          <a:lstStyle/>
-          <a:p>
-            <a:pPr algn="r"/>
-            <a:r>
-              <a:rPr kumimoji="1" lang="en-US" altLang="ja-JP" sz="1200" dirty="0"/>
-              <a:t>JST May 21 2023</a:t>
-            </a:r>
-            <a:endParaRPr kumimoji="1" lang="ja-JP" altLang="en-US" sz="1200" dirty="0"/>
-          </a:p>
-        </p:txBody>
-      </p:sp>
-    </p:spTree>
-    <p:extLst>
-      <p:ext uri="{BB962C8B-B14F-4D97-AF65-F5344CB8AC3E}">
-        <p14:creationId xmlns:p14="http://schemas.microsoft.com/office/powerpoint/2010/main" val="3259309326"/>
-      </p:ext>
-    </p:extLst>
-  </p:cSld>
-  <p:clrMapOvr>
-    <a:masterClrMapping/>
-  </p:clrMapOvr>
-</p:sld>
-</file>
-
-<file path=ppt/slides/slide11.xml><?xml version="1.0" encoding="utf-8"?>
-<p:sld xmlns:a="http://schemas.openxmlformats.org/drawingml/2006/main" xmlns:r="http://schemas.openxmlformats.org/officeDocument/2006/relationships" xmlns:p="http://schemas.openxmlformats.org/presentationml/2006/main">
-  <p:cSld>
-    <p:spTree>
-      <p:nvGrpSpPr>
-        <p:cNvPr id="1" name=""/>
-        <p:cNvGrpSpPr/>
-        <p:nvPr/>
-      </p:nvGrpSpPr>
-      <p:grpSpPr>
-        <a:xfrm>
-          <a:off x="0" y="0"/>
-          <a:ext cx="0" cy="0"/>
-          <a:chOff x="0" y="0"/>
-          <a:chExt cx="0" cy="0"/>
-        </a:xfrm>
-      </p:grpSpPr>
-      <p:sp>
-        <p:nvSpPr>
-          <p:cNvPr id="2" name="タイトル 1">
-            <a:extLst>
-              <a:ext uri="{FF2B5EF4-FFF2-40B4-BE49-F238E27FC236}">
                 <a16:creationId xmlns:a16="http://schemas.microsoft.com/office/drawing/2014/main" id="{6D9200B6-57B7-D6C9-43CD-F6B84A853687}"/>
               </a:ext>
             </a:extLst>
@@ -4669,7 +4432,7 @@
             <a:fld id="{51BE5F08-58E8-9243-A834-2B76637F595D}" type="slidenum">
               <a:rPr kumimoji="1" lang="ja-JP" altLang="en-US" smtClean="0"/>
               <a:pPr/>
-              <a:t>10</a:t>
+              <a:t>9</a:t>
             </a:fld>
             <a:endParaRPr kumimoji="1" lang="ja-JP" altLang="en-US"/>
           </a:p>
@@ -13007,702 +12770,6 @@
           <p:cNvPr id="2" name="タイトル 1">
             <a:extLst>
               <a:ext uri="{FF2B5EF4-FFF2-40B4-BE49-F238E27FC236}">
-                <a16:creationId xmlns:a16="http://schemas.microsoft.com/office/drawing/2014/main" id="{13C51C0C-3161-ADEB-5017-D8AA808A80C0}"/>
-              </a:ext>
-            </a:extLst>
-          </p:cNvPr>
-          <p:cNvSpPr>
-            <a:spLocks noGrp="1"/>
-          </p:cNvSpPr>
-          <p:nvPr>
-            <p:ph type="title"/>
-          </p:nvPr>
-        </p:nvSpPr>
-        <p:spPr/>
-        <p:txBody>
-          <a:bodyPr/>
-          <a:lstStyle/>
-          <a:p>
-            <a:r>
-              <a:rPr kumimoji="1" lang="en-US" altLang="ja-JP" dirty="0"/>
-              <a:t>Conclusion of Mad Mints</a:t>
-            </a:r>
-            <a:endParaRPr kumimoji="1" lang="ja-JP" altLang="en-US"/>
-          </a:p>
-        </p:txBody>
-      </p:sp>
-      <p:sp>
-        <p:nvSpPr>
-          <p:cNvPr id="3" name="コンテンツ プレースホルダー 2">
-            <a:extLst>
-              <a:ext uri="{FF2B5EF4-FFF2-40B4-BE49-F238E27FC236}">
-                <a16:creationId xmlns:a16="http://schemas.microsoft.com/office/drawing/2014/main" id="{33F5A0DD-F857-B153-08A0-FAC8BDF82A42}"/>
-              </a:ext>
-            </a:extLst>
-          </p:cNvPr>
-          <p:cNvSpPr>
-            <a:spLocks noGrp="1"/>
-          </p:cNvSpPr>
-          <p:nvPr>
-            <p:ph idx="1"/>
-          </p:nvPr>
-        </p:nvSpPr>
-        <p:spPr/>
-        <p:txBody>
-          <a:bodyPr/>
-          <a:lstStyle/>
-          <a:p>
-            <a:r>
-              <a:rPr kumimoji="1" lang="en-US" altLang="ja-JP" dirty="0"/>
-              <a:t>If you need fine-tuning speed, you should use Mad Mints.</a:t>
-            </a:r>
-            <a:endParaRPr kumimoji="1" lang="ja-JP" altLang="en-US"/>
-          </a:p>
-        </p:txBody>
-      </p:sp>
-      <p:sp>
-        <p:nvSpPr>
-          <p:cNvPr id="4" name="フッター プレースホルダー 3">
-            <a:extLst>
-              <a:ext uri="{FF2B5EF4-FFF2-40B4-BE49-F238E27FC236}">
-                <a16:creationId xmlns:a16="http://schemas.microsoft.com/office/drawing/2014/main" id="{4C218ADF-6D11-9355-D8BB-E4DB9265E7A6}"/>
-              </a:ext>
-            </a:extLst>
-          </p:cNvPr>
-          <p:cNvSpPr>
-            <a:spLocks noGrp="1"/>
-          </p:cNvSpPr>
-          <p:nvPr>
-            <p:ph type="ftr" sz="quarter" idx="11"/>
-          </p:nvPr>
-        </p:nvSpPr>
-        <p:spPr/>
-        <p:txBody>
-          <a:bodyPr/>
-          <a:lstStyle/>
-          <a:p>
-            <a:r>
-              <a:rPr kumimoji="1" lang="en-US" altLang="ja-JP"/>
-              <a:t>256hax</a:t>
-            </a:r>
-            <a:endParaRPr kumimoji="1" lang="ja-JP" altLang="en-US"/>
-          </a:p>
-        </p:txBody>
-      </p:sp>
-      <p:sp>
-        <p:nvSpPr>
-          <p:cNvPr id="5" name="スライド番号プレースホルダー 4">
-            <a:extLst>
-              <a:ext uri="{FF2B5EF4-FFF2-40B4-BE49-F238E27FC236}">
-                <a16:creationId xmlns:a16="http://schemas.microsoft.com/office/drawing/2014/main" id="{DD9DD953-7F72-CB4C-C8A1-FAE575F11739}"/>
-              </a:ext>
-            </a:extLst>
-          </p:cNvPr>
-          <p:cNvSpPr>
-            <a:spLocks noGrp="1"/>
-          </p:cNvSpPr>
-          <p:nvPr>
-            <p:ph type="sldNum" sz="quarter" idx="12"/>
-          </p:nvPr>
-        </p:nvSpPr>
-        <p:spPr/>
-        <p:txBody>
-          <a:bodyPr/>
-          <a:lstStyle/>
-          <a:p>
-            <a:fld id="{51BE5F08-58E8-9243-A834-2B76637F595D}" type="slidenum">
-              <a:rPr kumimoji="1" lang="ja-JP" altLang="en-US" smtClean="0"/>
-              <a:pPr/>
-              <a:t>6</a:t>
-            </a:fld>
-            <a:endParaRPr kumimoji="1" lang="ja-JP" altLang="en-US"/>
-          </a:p>
-        </p:txBody>
-      </p:sp>
-      <p:grpSp>
-        <p:nvGrpSpPr>
-          <p:cNvPr id="11" name="グループ化 10">
-            <a:extLst>
-              <a:ext uri="{FF2B5EF4-FFF2-40B4-BE49-F238E27FC236}">
-                <a16:creationId xmlns:a16="http://schemas.microsoft.com/office/drawing/2014/main" id="{5EB9D766-49DC-C14B-4EF4-4E5D88F7F46B}"/>
-              </a:ext>
-            </a:extLst>
-          </p:cNvPr>
-          <p:cNvGrpSpPr/>
-          <p:nvPr/>
-        </p:nvGrpSpPr>
-        <p:grpSpPr>
-          <a:xfrm>
-            <a:off x="838200" y="1679845"/>
-            <a:ext cx="10515600" cy="4640945"/>
-            <a:chOff x="838200" y="1745888"/>
-            <a:chExt cx="10515600" cy="2807644"/>
-          </a:xfrm>
-        </p:grpSpPr>
-        <p:sp>
-          <p:nvSpPr>
-            <p:cNvPr id="7" name="正方形/長方形 6">
-              <a:extLst>
-                <a:ext uri="{FF2B5EF4-FFF2-40B4-BE49-F238E27FC236}">
-                  <a16:creationId xmlns:a16="http://schemas.microsoft.com/office/drawing/2014/main" id="{CA5A8E90-BEB6-1A8E-EFAA-2DE859D5BF18}"/>
-                </a:ext>
-              </a:extLst>
-            </p:cNvPr>
-            <p:cNvSpPr/>
-            <p:nvPr/>
-          </p:nvSpPr>
-          <p:spPr>
-            <a:xfrm>
-              <a:off x="838200" y="1745888"/>
-              <a:ext cx="2137410" cy="1337041"/>
-            </a:xfrm>
-            <a:prstGeom prst="rect">
-              <a:avLst/>
-            </a:prstGeom>
-            <a:solidFill>
-              <a:schemeClr val="tx1"/>
-            </a:solidFill>
-            <a:ln>
-              <a:solidFill>
-                <a:schemeClr val="tx1"/>
-              </a:solidFill>
-            </a:ln>
-          </p:spPr>
-          <p:style>
-            <a:lnRef idx="2">
-              <a:schemeClr val="accent1">
-                <a:shade val="50000"/>
-              </a:schemeClr>
-            </a:lnRef>
-            <a:fillRef idx="1">
-              <a:schemeClr val="accent1"/>
-            </a:fillRef>
-            <a:effectRef idx="0">
-              <a:schemeClr val="accent1"/>
-            </a:effectRef>
-            <a:fontRef idx="minor">
-              <a:schemeClr val="lt1"/>
-            </a:fontRef>
-          </p:style>
-          <p:txBody>
-            <a:bodyPr rtlCol="0" anchor="ctr"/>
-            <a:lstStyle/>
-            <a:p>
-              <a:pPr algn="ctr"/>
-              <a:r>
-                <a:rPr kumimoji="1" lang="en-US" altLang="ja-JP" sz="2000" dirty="0">
-                  <a:solidFill>
-                    <a:schemeClr val="bg1"/>
-                  </a:solidFill>
-                </a:rPr>
-                <a:t>Value</a:t>
-              </a:r>
-              <a:endParaRPr kumimoji="1" lang="ja-JP" altLang="en-US" sz="2000">
-                <a:solidFill>
-                  <a:schemeClr val="bg1"/>
-                </a:solidFill>
-              </a:endParaRPr>
-            </a:p>
-          </p:txBody>
-        </p:sp>
-        <p:sp>
-          <p:nvSpPr>
-            <p:cNvPr id="8" name="正方形/長方形 7">
-              <a:extLst>
-                <a:ext uri="{FF2B5EF4-FFF2-40B4-BE49-F238E27FC236}">
-                  <a16:creationId xmlns:a16="http://schemas.microsoft.com/office/drawing/2014/main" id="{93D9A530-3FED-DB91-51EC-531DE0175D47}"/>
-                </a:ext>
-              </a:extLst>
-            </p:cNvPr>
-            <p:cNvSpPr/>
-            <p:nvPr/>
-          </p:nvSpPr>
-          <p:spPr>
-            <a:xfrm>
-              <a:off x="3120390" y="1745888"/>
-              <a:ext cx="8233410" cy="1337041"/>
-            </a:xfrm>
-            <a:prstGeom prst="rect">
-              <a:avLst/>
-            </a:prstGeom>
-            <a:noFill/>
-            <a:ln>
-              <a:noFill/>
-            </a:ln>
-          </p:spPr>
-          <p:style>
-            <a:lnRef idx="2">
-              <a:schemeClr val="accent1">
-                <a:shade val="50000"/>
-              </a:schemeClr>
-            </a:lnRef>
-            <a:fillRef idx="1">
-              <a:schemeClr val="accent1"/>
-            </a:fillRef>
-            <a:effectRef idx="0">
-              <a:schemeClr val="accent1"/>
-            </a:effectRef>
-            <a:fontRef idx="minor">
-              <a:schemeClr val="lt1"/>
-            </a:fontRef>
-          </p:style>
-          <p:txBody>
-            <a:bodyPr rtlCol="0" anchor="ctr"/>
-            <a:lstStyle/>
-            <a:p>
-              <a:pPr marL="285750" indent="-285750">
-                <a:buFont typeface="Arial" panose="020B0604020202020204" pitchFamily="34" charset="0"/>
-                <a:buChar char="•"/>
-              </a:pPr>
-              <a:r>
-                <a:rPr lang="en-US" altLang="ja-JP" sz="2000" dirty="0">
-                  <a:solidFill>
-                    <a:schemeClr val="tx1"/>
-                  </a:solidFill>
-                  <a:latin typeface="Söhne"/>
-                </a:rPr>
-                <a:t>Over</a:t>
-              </a:r>
-              <a:r>
-                <a:rPr lang="en-US" altLang="ja-JP" sz="2000" b="0" i="0" dirty="0">
-                  <a:solidFill>
-                    <a:schemeClr val="tx1"/>
-                  </a:solidFill>
-                  <a:effectLst/>
-                  <a:latin typeface="Söhne"/>
-                </a:rPr>
-                <a:t> </a:t>
-              </a:r>
-              <a:r>
-                <a:rPr lang="en-US" altLang="ja-JP" sz="2000" b="0" i="0" dirty="0">
-                  <a:solidFill>
-                    <a:srgbClr val="FF0000"/>
-                  </a:solidFill>
-                  <a:effectLst/>
-                  <a:latin typeface="Söhne"/>
-                </a:rPr>
-                <a:t>2 to 2.5 times</a:t>
-              </a:r>
-              <a:r>
-                <a:rPr lang="en-US" altLang="ja-JP" sz="2000" b="0" i="0" dirty="0">
-                  <a:solidFill>
-                    <a:schemeClr val="tx1"/>
-                  </a:solidFill>
-                  <a:effectLst/>
-                  <a:latin typeface="Söhne"/>
-                </a:rPr>
-                <a:t> </a:t>
-              </a:r>
-              <a:r>
-                <a:rPr lang="en-US" altLang="ja-JP" sz="2000" b="0" i="0" dirty="0">
-                  <a:solidFill>
-                    <a:srgbClr val="FF0000"/>
-                  </a:solidFill>
-                  <a:effectLst/>
-                  <a:latin typeface="Söhne"/>
-                </a:rPr>
-                <a:t>faster</a:t>
-              </a:r>
-              <a:r>
-                <a:rPr lang="en-US" altLang="ja-JP" sz="2000" b="0" i="0" dirty="0">
-                  <a:solidFill>
-                    <a:schemeClr val="tx1"/>
-                  </a:solidFill>
-                  <a:effectLst/>
-                  <a:latin typeface="Söhne"/>
-                </a:rPr>
-                <a:t> than the standard.</a:t>
-              </a:r>
-            </a:p>
-            <a:p>
-              <a:pPr marL="285750" indent="-285750">
-                <a:buFont typeface="Arial" panose="020B0604020202020204" pitchFamily="34" charset="0"/>
-                <a:buChar char="•"/>
-              </a:pPr>
-              <a:r>
-                <a:rPr lang="en-US" altLang="ja-JP" sz="2000" b="0" i="0" dirty="0">
-                  <a:solidFill>
-                    <a:schemeClr val="tx1"/>
-                  </a:solidFill>
-                  <a:effectLst/>
-                  <a:latin typeface="Söhne"/>
-                </a:rPr>
-                <a:t>Even with a </a:t>
-              </a:r>
-              <a:r>
-                <a:rPr lang="en-US" altLang="ja-JP" sz="2000" b="0" i="0" dirty="0">
-                  <a:solidFill>
-                    <a:srgbClr val="FF0000"/>
-                  </a:solidFill>
-                  <a:effectLst/>
-                  <a:latin typeface="Söhne"/>
-                </a:rPr>
-                <a:t>large number of instructions (e.g. 40)</a:t>
-              </a:r>
-              <a:r>
-                <a:rPr lang="en-US" altLang="ja-JP" sz="2000" b="0" i="0" dirty="0">
-                  <a:solidFill>
-                    <a:schemeClr val="tx1"/>
-                  </a:solidFill>
-                  <a:effectLst/>
-                  <a:latin typeface="Söhne"/>
-                </a:rPr>
-                <a:t>, the </a:t>
-              </a:r>
-              <a:r>
-                <a:rPr lang="en-US" altLang="ja-JP" sz="2000" b="0" i="0" dirty="0">
-                  <a:solidFill>
-                    <a:srgbClr val="FF0000"/>
-                  </a:solidFill>
-                  <a:effectLst/>
-                  <a:latin typeface="Söhne"/>
-                </a:rPr>
-                <a:t>speed is fast</a:t>
-              </a:r>
-              <a:r>
-                <a:rPr lang="en-US" altLang="ja-JP" sz="2000" b="0" i="0" dirty="0">
-                  <a:solidFill>
-                    <a:schemeClr val="tx1"/>
-                  </a:solidFill>
-                  <a:effectLst/>
-                  <a:latin typeface="Söhne"/>
-                </a:rPr>
-                <a:t>.</a:t>
-              </a:r>
-            </a:p>
-            <a:p>
-              <a:pPr marL="285750" indent="-285750">
-                <a:buFont typeface="Arial" panose="020B0604020202020204" pitchFamily="34" charset="0"/>
-                <a:buChar char="•"/>
-              </a:pPr>
-              <a:r>
-                <a:rPr kumimoji="1" lang="en-US" altLang="ja-JP" sz="2000" dirty="0">
-                  <a:solidFill>
-                    <a:schemeClr val="tx1"/>
-                  </a:solidFill>
-                </a:rPr>
-                <a:t>When the number of instructions is low, there is not much variation.</a:t>
-              </a:r>
-              <a:br>
-                <a:rPr kumimoji="1" lang="en-US" altLang="ja-JP" sz="2000" dirty="0">
-                  <a:solidFill>
-                    <a:schemeClr val="tx1"/>
-                  </a:solidFill>
-                </a:rPr>
-              </a:br>
-              <a:r>
-                <a:rPr kumimoji="1" lang="en-US" altLang="ja-JP" sz="2000" dirty="0">
-                  <a:solidFill>
-                    <a:schemeClr val="tx1"/>
-                  </a:solidFill>
-                </a:rPr>
-                <a:t>However, "Many drops make a shower", and there is a significant difference in speed when the trading volume is high.</a:t>
-              </a:r>
-            </a:p>
-            <a:p>
-              <a:pPr marL="285750" indent="-285750">
-                <a:buFont typeface="Arial" panose="020B0604020202020204" pitchFamily="34" charset="0"/>
-                <a:buChar char="•"/>
-              </a:pPr>
-              <a:r>
-                <a:rPr kumimoji="1" lang="en-US" altLang="ja-JP" sz="2000" dirty="0">
-                  <a:solidFill>
-                    <a:schemeClr val="tx1"/>
-                  </a:solidFill>
-                </a:rPr>
-                <a:t>Maintains a consistent and </a:t>
-              </a:r>
-              <a:r>
-                <a:rPr kumimoji="1" lang="en-US" altLang="ja-JP" sz="2000" dirty="0">
-                  <a:solidFill>
-                    <a:srgbClr val="FF0000"/>
-                  </a:solidFill>
-                </a:rPr>
-                <a:t>stable speed without any deviation(under 0.5 </a:t>
-              </a:r>
-              <a:r>
-                <a:rPr kumimoji="1" lang="en-US" altLang="ja-JP" sz="2000" dirty="0" err="1">
-                  <a:solidFill>
-                    <a:srgbClr val="FF0000"/>
-                  </a:solidFill>
-                </a:rPr>
-                <a:t>ms</a:t>
-              </a:r>
-              <a:r>
-                <a:rPr kumimoji="1" lang="en-US" altLang="ja-JP" sz="2000" dirty="0">
-                  <a:solidFill>
-                    <a:srgbClr val="FF0000"/>
-                  </a:solidFill>
-                </a:rPr>
-                <a:t>)</a:t>
-              </a:r>
-              <a:r>
-                <a:rPr kumimoji="1" lang="en-US" altLang="ja-JP" sz="2000" dirty="0">
-                  <a:solidFill>
-                    <a:schemeClr val="tx1"/>
-                  </a:solidFill>
-                </a:rPr>
-                <a:t>.</a:t>
-              </a:r>
-            </a:p>
-          </p:txBody>
-        </p:sp>
-        <p:sp>
-          <p:nvSpPr>
-            <p:cNvPr id="9" name="正方形/長方形 8">
-              <a:extLst>
-                <a:ext uri="{FF2B5EF4-FFF2-40B4-BE49-F238E27FC236}">
-                  <a16:creationId xmlns:a16="http://schemas.microsoft.com/office/drawing/2014/main" id="{B292B5AB-7AA6-6C92-891B-CF93D0C8767D}"/>
-                </a:ext>
-              </a:extLst>
-            </p:cNvPr>
-            <p:cNvSpPr/>
-            <p:nvPr/>
-          </p:nvSpPr>
-          <p:spPr>
-            <a:xfrm>
-              <a:off x="838200" y="3216491"/>
-              <a:ext cx="2137410" cy="1337041"/>
-            </a:xfrm>
-            <a:prstGeom prst="rect">
-              <a:avLst/>
-            </a:prstGeom>
-            <a:solidFill>
-              <a:schemeClr val="tx1"/>
-            </a:solidFill>
-            <a:ln>
-              <a:solidFill>
-                <a:schemeClr val="tx1"/>
-              </a:solidFill>
-            </a:ln>
-          </p:spPr>
-          <p:style>
-            <a:lnRef idx="2">
-              <a:schemeClr val="accent1">
-                <a:shade val="50000"/>
-              </a:schemeClr>
-            </a:lnRef>
-            <a:fillRef idx="1">
-              <a:schemeClr val="accent1"/>
-            </a:fillRef>
-            <a:effectRef idx="0">
-              <a:schemeClr val="accent1"/>
-            </a:effectRef>
-            <a:fontRef idx="minor">
-              <a:schemeClr val="lt1"/>
-            </a:fontRef>
-          </p:style>
-          <p:txBody>
-            <a:bodyPr rtlCol="0" anchor="ctr"/>
-            <a:lstStyle/>
-            <a:p>
-              <a:pPr algn="ctr"/>
-              <a:r>
-                <a:rPr kumimoji="1" lang="en-US" altLang="ja-JP" sz="2000" dirty="0">
-                  <a:solidFill>
-                    <a:schemeClr val="bg1"/>
-                  </a:solidFill>
-                </a:rPr>
-                <a:t>Example Case</a:t>
-              </a:r>
-              <a:endParaRPr kumimoji="1" lang="ja-JP" altLang="en-US" sz="2000">
-                <a:solidFill>
-                  <a:schemeClr val="bg1"/>
-                </a:solidFill>
-              </a:endParaRPr>
-            </a:p>
-          </p:txBody>
-        </p:sp>
-        <p:sp>
-          <p:nvSpPr>
-            <p:cNvPr id="10" name="正方形/長方形 9">
-              <a:extLst>
-                <a:ext uri="{FF2B5EF4-FFF2-40B4-BE49-F238E27FC236}">
-                  <a16:creationId xmlns:a16="http://schemas.microsoft.com/office/drawing/2014/main" id="{F3DA68F2-A797-A3A5-4D4E-0FBE70639120}"/>
-                </a:ext>
-              </a:extLst>
-            </p:cNvPr>
-            <p:cNvSpPr/>
-            <p:nvPr/>
-          </p:nvSpPr>
-          <p:spPr>
-            <a:xfrm>
-              <a:off x="3120390" y="3216491"/>
-              <a:ext cx="8233410" cy="1337041"/>
-            </a:xfrm>
-            <a:prstGeom prst="rect">
-              <a:avLst/>
-            </a:prstGeom>
-            <a:noFill/>
-            <a:ln>
-              <a:noFill/>
-            </a:ln>
-          </p:spPr>
-          <p:style>
-            <a:lnRef idx="2">
-              <a:schemeClr val="accent1">
-                <a:shade val="50000"/>
-              </a:schemeClr>
-            </a:lnRef>
-            <a:fillRef idx="1">
-              <a:schemeClr val="accent1"/>
-            </a:fillRef>
-            <a:effectRef idx="0">
-              <a:schemeClr val="accent1"/>
-            </a:effectRef>
-            <a:fontRef idx="minor">
-              <a:schemeClr val="lt1"/>
-            </a:fontRef>
-          </p:style>
-          <p:txBody>
-            <a:bodyPr rtlCol="0" anchor="ctr"/>
-            <a:lstStyle/>
-            <a:p>
-              <a:pPr marL="285750" indent="-285750">
-                <a:buFont typeface="Arial" panose="020B0604020202020204" pitchFamily="34" charset="0"/>
-                <a:buChar char="•"/>
-              </a:pPr>
-              <a:r>
-                <a:rPr lang="en-US" altLang="ja-JP" sz="2000" b="0" i="0" dirty="0">
-                  <a:solidFill>
-                    <a:schemeClr val="tx1"/>
-                  </a:solidFill>
-                  <a:effectLst/>
-                  <a:latin typeface="Söhne"/>
-                </a:rPr>
-                <a:t>It is useful when </a:t>
-              </a:r>
-              <a:r>
-                <a:rPr lang="en-US" altLang="ja-JP" sz="2000" b="0" i="0" dirty="0">
-                  <a:solidFill>
-                    <a:srgbClr val="FF0000"/>
-                  </a:solidFill>
-                  <a:effectLst/>
-                  <a:latin typeface="Söhne"/>
-                </a:rPr>
-                <a:t>fine-tuning speed is required in milliseconds</a:t>
-              </a:r>
-              <a:r>
-                <a:rPr lang="en-US" altLang="ja-JP" sz="2000" b="0" i="0" dirty="0">
-                  <a:solidFill>
-                    <a:schemeClr val="tx1"/>
-                  </a:solidFill>
-                  <a:effectLst/>
-                  <a:latin typeface="Söhne"/>
-                </a:rPr>
-                <a:t>.</a:t>
-              </a:r>
-            </a:p>
-            <a:p>
-              <a:pPr marL="285750" indent="-285750">
-                <a:buFont typeface="Arial" panose="020B0604020202020204" pitchFamily="34" charset="0"/>
-                <a:buChar char="•"/>
-              </a:pPr>
-              <a:r>
-                <a:rPr kumimoji="1" lang="en-US" altLang="ja-JP" sz="2000" dirty="0">
-                  <a:solidFill>
-                    <a:schemeClr val="tx1"/>
-                  </a:solidFill>
-                </a:rPr>
-                <a:t>e.g. Minting Site, DEX and Fully On-chain site.</a:t>
-              </a:r>
-            </a:p>
-            <a:p>
-              <a:pPr marL="285750" indent="-285750">
-                <a:buFont typeface="Arial" panose="020B0604020202020204" pitchFamily="34" charset="0"/>
-                <a:buChar char="•"/>
-              </a:pPr>
-              <a:r>
-                <a:rPr lang="en-US" altLang="ja-JP" sz="2000" b="0" i="0" dirty="0">
-                  <a:solidFill>
-                    <a:schemeClr val="tx1"/>
-                  </a:solidFill>
-                  <a:effectLst/>
-                  <a:latin typeface="Söhne"/>
-                </a:rPr>
-                <a:t>If speed is not a priority, standard transaction method is sufficient.</a:t>
-              </a:r>
-              <a:endParaRPr kumimoji="1" lang="ja-JP" altLang="en-US" sz="2000">
-                <a:solidFill>
-                  <a:schemeClr val="tx1"/>
-                </a:solidFill>
-              </a:endParaRPr>
-            </a:p>
-          </p:txBody>
-        </p:sp>
-      </p:grpSp>
-      <p:sp>
-        <p:nvSpPr>
-          <p:cNvPr id="6" name="テキスト ボックス 5">
-            <a:extLst>
-              <a:ext uri="{FF2B5EF4-FFF2-40B4-BE49-F238E27FC236}">
-                <a16:creationId xmlns:a16="http://schemas.microsoft.com/office/drawing/2014/main" id="{5BE4B43E-7BA8-FB3B-FC8A-822C8CDC6FD8}"/>
-              </a:ext>
-            </a:extLst>
-          </p:cNvPr>
-          <p:cNvSpPr txBox="1"/>
-          <p:nvPr/>
-        </p:nvSpPr>
-        <p:spPr>
-          <a:xfrm>
-            <a:off x="10729139" y="9225"/>
-            <a:ext cx="1443600" cy="315912"/>
-          </a:xfrm>
-          <a:prstGeom prst="rect">
-            <a:avLst/>
-          </a:prstGeom>
-          <a:noFill/>
-        </p:spPr>
-        <p:txBody>
-          <a:bodyPr wrap="square" rtlCol="0">
-            <a:noAutofit/>
-          </a:bodyPr>
-          <a:lstStyle/>
-          <a:p>
-            <a:pPr algn="r"/>
-            <a:r>
-              <a:rPr kumimoji="1" lang="en-US" altLang="ja-JP" sz="1200" dirty="0"/>
-              <a:t>JST May 21 2023</a:t>
-            </a:r>
-            <a:endParaRPr kumimoji="1" lang="ja-JP" altLang="en-US" sz="1200" dirty="0"/>
-          </a:p>
-        </p:txBody>
-      </p:sp>
-    </p:spTree>
-    <p:extLst>
-      <p:ext uri="{BB962C8B-B14F-4D97-AF65-F5344CB8AC3E}">
-        <p14:creationId xmlns:p14="http://schemas.microsoft.com/office/powerpoint/2010/main" val="568833797"/>
-      </p:ext>
-    </p:extLst>
-  </p:cSld>
-  <p:clrMapOvr>
-    <a:masterClrMapping/>
-  </p:clrMapOvr>
-</p:sld>
-</file>
-
-<file path=ppt/slides/slide8.xml><?xml version="1.0" encoding="utf-8"?>
-<p:sld xmlns:a="http://schemas.openxmlformats.org/drawingml/2006/main" xmlns:r="http://schemas.openxmlformats.org/officeDocument/2006/relationships" xmlns:p="http://schemas.openxmlformats.org/presentationml/2006/main">
-  <p:cSld>
-    <p:spTree>
-      <p:nvGrpSpPr>
-        <p:cNvPr id="1" name=""/>
-        <p:cNvGrpSpPr/>
-        <p:nvPr/>
-      </p:nvGrpSpPr>
-      <p:grpSpPr>
-        <a:xfrm>
-          <a:off x="0" y="0"/>
-          <a:ext cx="0" cy="0"/>
-          <a:chOff x="0" y="0"/>
-          <a:chExt cx="0" cy="0"/>
-        </a:xfrm>
-      </p:grpSpPr>
-      <p:sp>
-        <p:nvSpPr>
-          <p:cNvPr id="2" name="タイトル 1">
-            <a:extLst>
-              <a:ext uri="{FF2B5EF4-FFF2-40B4-BE49-F238E27FC236}">
                 <a16:creationId xmlns:a16="http://schemas.microsoft.com/office/drawing/2014/main" id="{43250BC8-4F2A-7219-E8D7-268AD2771F2E}"/>
               </a:ext>
             </a:extLst>
@@ -13813,7 +12880,7 @@
             <a:fld id="{51BE5F08-58E8-9243-A834-2B76637F595D}" type="slidenum">
               <a:rPr kumimoji="1" lang="ja-JP" altLang="en-US" smtClean="0"/>
               <a:pPr/>
-              <a:t>7</a:t>
+              <a:t>6</a:t>
             </a:fld>
             <a:endParaRPr kumimoji="1" lang="ja-JP" altLang="en-US"/>
           </a:p>
@@ -15111,7 +14178,7 @@
 </p:sld>
 </file>
 
-<file path=ppt/slides/slide9.xml><?xml version="1.0" encoding="utf-8"?>
+<file path=ppt/slides/slide8.xml><?xml version="1.0" encoding="utf-8"?>
 <p:sld xmlns:a="http://schemas.openxmlformats.org/drawingml/2006/main" xmlns:r="http://schemas.openxmlformats.org/officeDocument/2006/relationships" xmlns:p="http://schemas.openxmlformats.org/presentationml/2006/main">
   <p:cSld>
     <p:spTree>
@@ -15210,7 +14277,7 @@
             <a:fld id="{51BE5F08-58E8-9243-A834-2B76637F595D}" type="slidenum">
               <a:rPr kumimoji="1" lang="ja-JP" altLang="en-US" smtClean="0"/>
               <a:pPr/>
-              <a:t>8</a:t>
+              <a:t>7</a:t>
             </a:fld>
             <a:endParaRPr kumimoji="1" lang="ja-JP" altLang="en-US"/>
           </a:p>
@@ -15498,6 +14565,242 @@
     <p:extLst>
       <p:ext uri="{BB962C8B-B14F-4D97-AF65-F5344CB8AC3E}">
         <p14:creationId xmlns:p14="http://schemas.microsoft.com/office/powerpoint/2010/main" val="642563756"/>
+      </p:ext>
+    </p:extLst>
+  </p:cSld>
+  <p:clrMapOvr>
+    <a:masterClrMapping/>
+  </p:clrMapOvr>
+</p:sld>
+</file>
+
+<file path=ppt/slides/slide9.xml><?xml version="1.0" encoding="utf-8"?>
+<p:sld xmlns:a="http://schemas.openxmlformats.org/drawingml/2006/main" xmlns:r="http://schemas.openxmlformats.org/officeDocument/2006/relationships" xmlns:p="http://schemas.openxmlformats.org/presentationml/2006/main">
+  <p:cSld>
+    <p:spTree>
+      <p:nvGrpSpPr>
+        <p:cNvPr id="1" name=""/>
+        <p:cNvGrpSpPr/>
+        <p:nvPr/>
+      </p:nvGrpSpPr>
+      <p:grpSpPr>
+        <a:xfrm>
+          <a:off x="0" y="0"/>
+          <a:ext cx="0" cy="0"/>
+          <a:chOff x="0" y="0"/>
+          <a:chExt cx="0" cy="0"/>
+        </a:xfrm>
+      </p:grpSpPr>
+      <p:sp>
+        <p:nvSpPr>
+          <p:cNvPr id="2" name="タイトル 1">
+            <a:extLst>
+              <a:ext uri="{FF2B5EF4-FFF2-40B4-BE49-F238E27FC236}">
+                <a16:creationId xmlns:a16="http://schemas.microsoft.com/office/drawing/2014/main" id="{90FD3E59-428E-D6B2-B3C5-F6F7B480123B}"/>
+              </a:ext>
+            </a:extLst>
+          </p:cNvPr>
+          <p:cNvSpPr>
+            <a:spLocks noGrp="1"/>
+          </p:cNvSpPr>
+          <p:nvPr>
+            <p:ph type="title"/>
+          </p:nvPr>
+        </p:nvSpPr>
+        <p:spPr/>
+        <p:txBody>
+          <a:bodyPr/>
+          <a:lstStyle/>
+          <a:p>
+            <a:r>
+              <a:rPr kumimoji="1" lang="en-US" altLang="ja-JP" dirty="0"/>
+              <a:t>Example Code</a:t>
+            </a:r>
+            <a:endParaRPr kumimoji="1" lang="ja-JP" altLang="en-US"/>
+          </a:p>
+        </p:txBody>
+      </p:sp>
+      <p:sp>
+        <p:nvSpPr>
+          <p:cNvPr id="4" name="フッター プレースホルダー 3">
+            <a:extLst>
+              <a:ext uri="{FF2B5EF4-FFF2-40B4-BE49-F238E27FC236}">
+                <a16:creationId xmlns:a16="http://schemas.microsoft.com/office/drawing/2014/main" id="{84F8FC5D-67C5-EB08-DA8F-DC43154573F5}"/>
+              </a:ext>
+            </a:extLst>
+          </p:cNvPr>
+          <p:cNvSpPr>
+            <a:spLocks noGrp="1"/>
+          </p:cNvSpPr>
+          <p:nvPr>
+            <p:ph type="ftr" sz="quarter" idx="11"/>
+          </p:nvPr>
+        </p:nvSpPr>
+        <p:spPr/>
+        <p:txBody>
+          <a:bodyPr/>
+          <a:lstStyle/>
+          <a:p>
+            <a:r>
+              <a:rPr kumimoji="1" lang="en-US" altLang="ja-JP"/>
+              <a:t>256hax</a:t>
+            </a:r>
+            <a:endParaRPr kumimoji="1" lang="ja-JP" altLang="en-US"/>
+          </a:p>
+        </p:txBody>
+      </p:sp>
+      <p:sp>
+        <p:nvSpPr>
+          <p:cNvPr id="5" name="スライド番号プレースホルダー 4">
+            <a:extLst>
+              <a:ext uri="{FF2B5EF4-FFF2-40B4-BE49-F238E27FC236}">
+                <a16:creationId xmlns:a16="http://schemas.microsoft.com/office/drawing/2014/main" id="{9810586D-71D7-C56A-D81E-323600AAE558}"/>
+              </a:ext>
+            </a:extLst>
+          </p:cNvPr>
+          <p:cNvSpPr>
+            <a:spLocks noGrp="1"/>
+          </p:cNvSpPr>
+          <p:nvPr>
+            <p:ph type="sldNum" sz="quarter" idx="12"/>
+          </p:nvPr>
+        </p:nvSpPr>
+        <p:spPr/>
+        <p:txBody>
+          <a:bodyPr/>
+          <a:lstStyle/>
+          <a:p>
+            <a:fld id="{51BE5F08-58E8-9243-A834-2B76637F595D}" type="slidenum">
+              <a:rPr kumimoji="1" lang="ja-JP" altLang="en-US" smtClean="0"/>
+              <a:pPr/>
+              <a:t>8</a:t>
+            </a:fld>
+            <a:endParaRPr kumimoji="1" lang="ja-JP" altLang="en-US"/>
+          </a:p>
+        </p:txBody>
+      </p:sp>
+      <p:sp>
+        <p:nvSpPr>
+          <p:cNvPr id="8" name="テキスト ボックス 7">
+            <a:extLst>
+              <a:ext uri="{FF2B5EF4-FFF2-40B4-BE49-F238E27FC236}">
+                <a16:creationId xmlns:a16="http://schemas.microsoft.com/office/drawing/2014/main" id="{F6E10048-C70B-798B-1A63-B0DE8166ED8A}"/>
+              </a:ext>
+            </a:extLst>
+          </p:cNvPr>
+          <p:cNvSpPr txBox="1"/>
+          <p:nvPr/>
+        </p:nvSpPr>
+        <p:spPr>
+          <a:xfrm>
+            <a:off x="838200" y="1853765"/>
+            <a:ext cx="10515600" cy="1118035"/>
+          </a:xfrm>
+          <a:prstGeom prst="rect">
+            <a:avLst/>
+          </a:prstGeom>
+          <a:noFill/>
+        </p:spPr>
+        <p:txBody>
+          <a:bodyPr wrap="square" rtlCol="0">
+            <a:noAutofit/>
+          </a:bodyPr>
+          <a:lstStyle/>
+          <a:p>
+            <a:pPr algn="ctr"/>
+            <a:r>
+              <a:rPr kumimoji="1" lang="en-US" altLang="ja-JP" sz="2000" dirty="0">
+                <a:hlinkClick r:id="rId2"/>
+              </a:rPr>
+              <a:t>https://github.com/256hax/mad-mints</a:t>
+            </a:r>
+            <a:endParaRPr kumimoji="1" lang="en-US" altLang="ja-JP" sz="2000" dirty="0"/>
+          </a:p>
+          <a:p>
+            <a:pPr algn="ctr"/>
+            <a:endParaRPr kumimoji="1" lang="en-US" altLang="ja-JP" sz="2000" dirty="0"/>
+          </a:p>
+          <a:p>
+            <a:pPr algn="ctr"/>
+            <a:r>
+              <a:rPr kumimoji="1" lang="en-US" altLang="ja-JP" sz="2000" dirty="0"/>
+              <a:t>Experiment purpose only.</a:t>
+            </a:r>
+            <a:endParaRPr kumimoji="1" lang="ja-JP" altLang="en-US" sz="2000" dirty="0"/>
+          </a:p>
+        </p:txBody>
+      </p:sp>
+      <p:pic>
+        <p:nvPicPr>
+          <p:cNvPr id="12" name="図 11">
+            <a:extLst>
+              <a:ext uri="{FF2B5EF4-FFF2-40B4-BE49-F238E27FC236}">
+                <a16:creationId xmlns:a16="http://schemas.microsoft.com/office/drawing/2014/main" id="{30DEEAB5-885C-A99D-ADA6-A773ECBE110B}"/>
+              </a:ext>
+            </a:extLst>
+          </p:cNvPr>
+          <p:cNvPicPr>
+            <a:picLocks noChangeAspect="1"/>
+          </p:cNvPicPr>
+          <p:nvPr/>
+        </p:nvPicPr>
+        <p:blipFill>
+          <a:blip r:embed="rId3"/>
+          <a:stretch>
+            <a:fillRect/>
+          </a:stretch>
+        </p:blipFill>
+        <p:spPr>
+          <a:xfrm>
+            <a:off x="4667250" y="2971800"/>
+            <a:ext cx="2857500" cy="2857500"/>
+          </a:xfrm>
+          <a:prstGeom prst="rect">
+            <a:avLst/>
+          </a:prstGeom>
+        </p:spPr>
+      </p:pic>
+      <p:sp>
+        <p:nvSpPr>
+          <p:cNvPr id="3" name="テキスト ボックス 2">
+            <a:extLst>
+              <a:ext uri="{FF2B5EF4-FFF2-40B4-BE49-F238E27FC236}">
+                <a16:creationId xmlns:a16="http://schemas.microsoft.com/office/drawing/2014/main" id="{AE19384B-A3A9-6882-17B9-02D91620C991}"/>
+              </a:ext>
+            </a:extLst>
+          </p:cNvPr>
+          <p:cNvSpPr txBox="1"/>
+          <p:nvPr/>
+        </p:nvSpPr>
+        <p:spPr>
+          <a:xfrm>
+            <a:off x="10729139" y="9225"/>
+            <a:ext cx="1443600" cy="315912"/>
+          </a:xfrm>
+          <a:prstGeom prst="rect">
+            <a:avLst/>
+          </a:prstGeom>
+          <a:noFill/>
+        </p:spPr>
+        <p:txBody>
+          <a:bodyPr wrap="square" rtlCol="0">
+            <a:noAutofit/>
+          </a:bodyPr>
+          <a:lstStyle/>
+          <a:p>
+            <a:pPr algn="r"/>
+            <a:r>
+              <a:rPr kumimoji="1" lang="en-US" altLang="ja-JP" sz="1200" dirty="0"/>
+              <a:t>JST May 21 2023</a:t>
+            </a:r>
+            <a:endParaRPr kumimoji="1" lang="ja-JP" altLang="en-US" sz="1200" dirty="0"/>
+          </a:p>
+        </p:txBody>
+      </p:sp>
+    </p:spTree>
+    <p:extLst>
+      <p:ext uri="{BB962C8B-B14F-4D97-AF65-F5344CB8AC3E}">
+        <p14:creationId xmlns:p14="http://schemas.microsoft.com/office/powerpoint/2010/main" val="3259309326"/>
       </p:ext>
     </p:extLst>
   </p:cSld>

</xml_diff>

<commit_message>
docs: update *1 comment in P.4
</commit_message>
<xml_diff>
--- a/docs/Mad-Mints.pptx
+++ b/docs/Mad-Mints.pptx
@@ -206,7 +206,7 @@
           <a:p>
             <a:fld id="{0E3AE901-84B3-3248-AD12-BEDA7F301CE3}" type="datetimeFigureOut">
               <a:rPr kumimoji="1" lang="ja-JP" altLang="en-US" smtClean="0"/>
-              <a:t>2023/5/28</a:t>
+              <a:t>2023/5/29</a:t>
             </a:fld>
             <a:endParaRPr kumimoji="1" lang="ja-JP" altLang="en-US"/>
           </a:p>
@@ -661,7 +661,7 @@
           <a:p>
             <a:fld id="{E3F90748-6578-AC42-962A-9F4B1F5FBFAD}" type="datetime1">
               <a:rPr kumimoji="1" lang="ja-JP" altLang="en-US" smtClean="0"/>
-              <a:t>2023/5/28</a:t>
+              <a:t>2023/5/29</a:t>
             </a:fld>
             <a:endParaRPr kumimoji="1" lang="ja-JP" altLang="en-US"/>
           </a:p>
@@ -906,7 +906,7 @@
           <a:p>
             <a:fld id="{BE6DFB40-8C3F-A944-983D-65243E3E0DC7}" type="datetime1">
               <a:rPr kumimoji="1" lang="ja-JP" altLang="en-US" smtClean="0"/>
-              <a:t>2023/5/28</a:t>
+              <a:t>2023/5/29</a:t>
             </a:fld>
             <a:endParaRPr kumimoji="1" lang="ja-JP" altLang="en-US"/>
           </a:p>
@@ -1146,7 +1146,7 @@
           <a:p>
             <a:fld id="{631B2AF4-14FC-314E-A304-69D6AC20AFC1}" type="datetime1">
               <a:rPr kumimoji="1" lang="ja-JP" altLang="en-US" smtClean="0"/>
-              <a:t>2023/5/28</a:t>
+              <a:t>2023/5/29</a:t>
             </a:fld>
             <a:endParaRPr kumimoji="1" lang="ja-JP" altLang="en-US"/>
           </a:p>
@@ -1415,7 +1415,7 @@
             <a:fld id="{73EFA7FA-4B80-324E-84D1-8F8384F1BA5D}" type="datetime1">
               <a:rPr kumimoji="1" lang="ja-JP" altLang="en-US" smtClean="0"/>
               <a:pPr/>
-              <a:t>2023/5/28</a:t>
+              <a:t>2023/5/29</a:t>
             </a:fld>
             <a:endParaRPr kumimoji="1" lang="ja-JP" altLang="en-US"/>
           </a:p>
@@ -1742,7 +1742,7 @@
           <a:p>
             <a:fld id="{D2E220AC-C2A7-024E-ACAB-4DB6052A376C}" type="datetime1">
               <a:rPr kumimoji="1" lang="ja-JP" altLang="en-US" smtClean="0"/>
-              <a:t>2023/5/28</a:t>
+              <a:t>2023/5/29</a:t>
             </a:fld>
             <a:endParaRPr kumimoji="1" lang="ja-JP" altLang="en-US"/>
           </a:p>
@@ -2066,7 +2066,7 @@
           <a:p>
             <a:fld id="{CC48FC5F-5874-5040-B9D3-0BB86491154B}" type="datetime1">
               <a:rPr kumimoji="1" lang="ja-JP" altLang="en-US" smtClean="0"/>
-              <a:t>2023/5/28</a:t>
+              <a:t>2023/5/29</a:t>
             </a:fld>
             <a:endParaRPr kumimoji="1" lang="ja-JP" altLang="en-US"/>
           </a:p>
@@ -2525,7 +2525,7 @@
           <a:p>
             <a:fld id="{667059AF-CDDF-A545-B437-20B256967FD9}" type="datetime1">
               <a:rPr kumimoji="1" lang="ja-JP" altLang="en-US" smtClean="0"/>
-              <a:t>2023/5/28</a:t>
+              <a:t>2023/5/29</a:t>
             </a:fld>
             <a:endParaRPr kumimoji="1" lang="ja-JP" altLang="en-US"/>
           </a:p>
@@ -2671,7 +2671,7 @@
           <a:p>
             <a:fld id="{15B6534E-A8F6-864C-985B-4DB3D4538E40}" type="datetime1">
               <a:rPr kumimoji="1" lang="ja-JP" altLang="en-US" smtClean="0"/>
-              <a:t>2023/5/28</a:t>
+              <a:t>2023/5/29</a:t>
             </a:fld>
             <a:endParaRPr kumimoji="1" lang="ja-JP" altLang="en-US"/>
           </a:p>
@@ -2794,7 +2794,7 @@
           <a:p>
             <a:fld id="{D63D519C-9325-DD4F-A5F6-0AFD37CE8635}" type="datetime1">
               <a:rPr kumimoji="1" lang="ja-JP" altLang="en-US" smtClean="0"/>
-              <a:t>2023/5/28</a:t>
+              <a:t>2023/5/29</a:t>
             </a:fld>
             <a:endParaRPr kumimoji="1" lang="ja-JP" altLang="en-US"/>
           </a:p>
@@ -3131,7 +3131,7 @@
           <a:p>
             <a:fld id="{5503B069-C866-8C47-A1B1-6AEF053A8792}" type="datetime1">
               <a:rPr kumimoji="1" lang="ja-JP" altLang="en-US" smtClean="0"/>
-              <a:t>2023/5/28</a:t>
+              <a:t>2023/5/29</a:t>
             </a:fld>
             <a:endParaRPr kumimoji="1" lang="ja-JP" altLang="en-US"/>
           </a:p>
@@ -3416,7 +3416,7 @@
           <a:p>
             <a:fld id="{C183513C-F2F4-B940-8F47-6502D3E9B9CA}" type="datetime1">
               <a:rPr kumimoji="1" lang="ja-JP" altLang="en-US" smtClean="0"/>
-              <a:t>2023/5/28</a:t>
+              <a:t>2023/5/29</a:t>
             </a:fld>
             <a:endParaRPr kumimoji="1" lang="ja-JP" altLang="en-US"/>
           </a:p>
@@ -3620,7 +3620,7 @@
             <a:fld id="{E55A93C3-7990-6040-9FF9-3C243F65B473}" type="datetime1">
               <a:rPr kumimoji="1" lang="ja-JP" altLang="en-US" smtClean="0"/>
               <a:pPr/>
-              <a:t>2023/5/28</a:t>
+              <a:t>2023/5/29</a:t>
             </a:fld>
             <a:endParaRPr kumimoji="1" lang="ja-JP" altLang="en-US"/>
           </a:p>
@@ -10177,7 +10177,7 @@
           <a:p>
             <a:r>
               <a:rPr kumimoji="1" lang="en-US" altLang="ja-JP" sz="1200" dirty="0"/>
-              <a:t>*1 Using </a:t>
+              <a:t>*1 Create Mint Account and Metadata Account Using </a:t>
             </a:r>
             <a:r>
               <a:rPr kumimoji="1" lang="en-US" altLang="ja-JP" sz="1200" dirty="0" err="1"/>
@@ -10185,7 +10185,7 @@
             </a:r>
             <a:r>
               <a:rPr kumimoji="1" lang="en-US" altLang="ja-JP" sz="1200" dirty="0"/>
-              <a:t> JavaScript SDK.</a:t>
+              <a:t> JavaScript SDK. It's not including upload Metadata JSON and image, verify collection.</a:t>
             </a:r>
           </a:p>
           <a:p>

</xml_diff>

<commit_message>
docs: update cons (total fees) at P.3
</commit_message>
<xml_diff>
--- a/docs/Mad-Mints.pptx
+++ b/docs/Mad-Mints.pptx
@@ -206,7 +206,7 @@
           <a:p>
             <a:fld id="{0E3AE901-84B3-3248-AD12-BEDA7F301CE3}" type="datetimeFigureOut">
               <a:rPr kumimoji="1" lang="ja-JP" altLang="en-US" smtClean="0"/>
-              <a:t>2023/5/29</a:t>
+              <a:t>2023/6/12</a:t>
             </a:fld>
             <a:endParaRPr kumimoji="1" lang="ja-JP" altLang="en-US"/>
           </a:p>
@@ -661,7 +661,7 @@
           <a:p>
             <a:fld id="{E3F90748-6578-AC42-962A-9F4B1F5FBFAD}" type="datetime1">
               <a:rPr kumimoji="1" lang="ja-JP" altLang="en-US" smtClean="0"/>
-              <a:t>2023/5/29</a:t>
+              <a:t>2023/6/12</a:t>
             </a:fld>
             <a:endParaRPr kumimoji="1" lang="ja-JP" altLang="en-US"/>
           </a:p>
@@ -906,7 +906,7 @@
           <a:p>
             <a:fld id="{BE6DFB40-8C3F-A944-983D-65243E3E0DC7}" type="datetime1">
               <a:rPr kumimoji="1" lang="ja-JP" altLang="en-US" smtClean="0"/>
-              <a:t>2023/5/29</a:t>
+              <a:t>2023/6/12</a:t>
             </a:fld>
             <a:endParaRPr kumimoji="1" lang="ja-JP" altLang="en-US"/>
           </a:p>
@@ -1146,7 +1146,7 @@
           <a:p>
             <a:fld id="{631B2AF4-14FC-314E-A304-69D6AC20AFC1}" type="datetime1">
               <a:rPr kumimoji="1" lang="ja-JP" altLang="en-US" smtClean="0"/>
-              <a:t>2023/5/29</a:t>
+              <a:t>2023/6/12</a:t>
             </a:fld>
             <a:endParaRPr kumimoji="1" lang="ja-JP" altLang="en-US"/>
           </a:p>
@@ -1415,7 +1415,7 @@
             <a:fld id="{73EFA7FA-4B80-324E-84D1-8F8384F1BA5D}" type="datetime1">
               <a:rPr kumimoji="1" lang="ja-JP" altLang="en-US" smtClean="0"/>
               <a:pPr/>
-              <a:t>2023/5/29</a:t>
+              <a:t>2023/6/12</a:t>
             </a:fld>
             <a:endParaRPr kumimoji="1" lang="ja-JP" altLang="en-US"/>
           </a:p>
@@ -1742,7 +1742,7 @@
           <a:p>
             <a:fld id="{D2E220AC-C2A7-024E-ACAB-4DB6052A376C}" type="datetime1">
               <a:rPr kumimoji="1" lang="ja-JP" altLang="en-US" smtClean="0"/>
-              <a:t>2023/5/29</a:t>
+              <a:t>2023/6/12</a:t>
             </a:fld>
             <a:endParaRPr kumimoji="1" lang="ja-JP" altLang="en-US"/>
           </a:p>
@@ -2066,7 +2066,7 @@
           <a:p>
             <a:fld id="{CC48FC5F-5874-5040-B9D3-0BB86491154B}" type="datetime1">
               <a:rPr kumimoji="1" lang="ja-JP" altLang="en-US" smtClean="0"/>
-              <a:t>2023/5/29</a:t>
+              <a:t>2023/6/12</a:t>
             </a:fld>
             <a:endParaRPr kumimoji="1" lang="ja-JP" altLang="en-US"/>
           </a:p>
@@ -2525,7 +2525,7 @@
           <a:p>
             <a:fld id="{667059AF-CDDF-A545-B437-20B256967FD9}" type="datetime1">
               <a:rPr kumimoji="1" lang="ja-JP" altLang="en-US" smtClean="0"/>
-              <a:t>2023/5/29</a:t>
+              <a:t>2023/6/12</a:t>
             </a:fld>
             <a:endParaRPr kumimoji="1" lang="ja-JP" altLang="en-US"/>
           </a:p>
@@ -2671,7 +2671,7 @@
           <a:p>
             <a:fld id="{15B6534E-A8F6-864C-985B-4DB3D4538E40}" type="datetime1">
               <a:rPr kumimoji="1" lang="ja-JP" altLang="en-US" smtClean="0"/>
-              <a:t>2023/5/29</a:t>
+              <a:t>2023/6/12</a:t>
             </a:fld>
             <a:endParaRPr kumimoji="1" lang="ja-JP" altLang="en-US"/>
           </a:p>
@@ -2794,7 +2794,7 @@
           <a:p>
             <a:fld id="{D63D519C-9325-DD4F-A5F6-0AFD37CE8635}" type="datetime1">
               <a:rPr kumimoji="1" lang="ja-JP" altLang="en-US" smtClean="0"/>
-              <a:t>2023/5/29</a:t>
+              <a:t>2023/6/12</a:t>
             </a:fld>
             <a:endParaRPr kumimoji="1" lang="ja-JP" altLang="en-US"/>
           </a:p>
@@ -3131,7 +3131,7 @@
           <a:p>
             <a:fld id="{5503B069-C866-8C47-A1B1-6AEF053A8792}" type="datetime1">
               <a:rPr kumimoji="1" lang="ja-JP" altLang="en-US" smtClean="0"/>
-              <a:t>2023/5/29</a:t>
+              <a:t>2023/6/12</a:t>
             </a:fld>
             <a:endParaRPr kumimoji="1" lang="ja-JP" altLang="en-US"/>
           </a:p>
@@ -3416,7 +3416,7 @@
           <a:p>
             <a:fld id="{C183513C-F2F4-B940-8F47-6502D3E9B9CA}" type="datetime1">
               <a:rPr kumimoji="1" lang="ja-JP" altLang="en-US" smtClean="0"/>
-              <a:t>2023/5/29</a:t>
+              <a:t>2023/6/12</a:t>
             </a:fld>
             <a:endParaRPr kumimoji="1" lang="ja-JP" altLang="en-US"/>
           </a:p>
@@ -3620,7 +3620,7 @@
             <a:fld id="{E55A93C3-7990-6040-9FF9-3C243F65B473}" type="datetime1">
               <a:rPr kumimoji="1" lang="ja-JP" altLang="en-US" smtClean="0"/>
               <a:pPr/>
-              <a:t>2023/5/29</a:t>
+              <a:t>2023/6/12</a:t>
             </a:fld>
             <a:endParaRPr kumimoji="1" lang="ja-JP" altLang="en-US"/>
           </a:p>
@@ -7449,9 +7449,9 @@
         <p:grpSpPr>
           <a:xfrm>
             <a:off x="838200" y="1409471"/>
-            <a:ext cx="10515600" cy="4640945"/>
+            <a:ext cx="10515600" cy="4615363"/>
             <a:chOff x="838200" y="1745888"/>
-            <a:chExt cx="10515600" cy="2807644"/>
+            <a:chExt cx="10515600" cy="2160707"/>
           </a:xfrm>
         </p:grpSpPr>
         <p:sp>
@@ -7714,8 +7714,8 @@
           </p:nvSpPr>
           <p:spPr>
             <a:xfrm>
-              <a:off x="838200" y="3216491"/>
-              <a:ext cx="2137410" cy="1337041"/>
+              <a:off x="838200" y="3224193"/>
+              <a:ext cx="2137410" cy="682402"/>
             </a:xfrm>
             <a:prstGeom prst="rect">
               <a:avLst/>
@@ -7780,8 +7780,8 @@
           </p:nvSpPr>
           <p:spPr>
             <a:xfrm>
-              <a:off x="3120390" y="3216491"/>
-              <a:ext cx="8233410" cy="1337041"/>
+              <a:off x="3120390" y="3224193"/>
+              <a:ext cx="8233410" cy="682402"/>
             </a:xfrm>
             <a:prstGeom prst="rect">
               <a:avLst/>
@@ -7833,10 +7833,20 @@
                   <a:effectLst/>
                   <a:latin typeface="Söhne"/>
                 </a:rPr>
-                <a:t>fine-tuning speed is required in milliseconds</a:t>
+                <a:t>fine-tuning speed is required in </a:t>
               </a:r>
               <a:r>
-                <a:rPr lang="en-US" altLang="ja-JP" sz="2000" b="0" i="0" dirty="0">
+                <a:rPr lang="en-US" altLang="ja-JP" sz="2000" b="0" i="0">
+                  <a:solidFill>
+                    <a:srgbClr val="FF0000"/>
+                  </a:solidFill>
+                  <a:effectLst/>
+                  <a:latin typeface="Söhne"/>
+                </a:rPr>
+                <a:t>milliseconds</a:t>
+              </a:r>
+              <a:r>
+                <a:rPr lang="en-US" altLang="ja-JP" sz="2000" b="0" i="0">
                   <a:solidFill>
                     <a:schemeClr val="tx1"/>
                   </a:solidFill>
@@ -7845,19 +7855,30 @@
                 </a:rPr>
                 <a:t>.</a:t>
               </a:r>
-            </a:p>
-            <a:p>
-              <a:pPr marL="285750" indent="-285750">
-                <a:buFont typeface="Arial" panose="020B0604020202020204" pitchFamily="34" charset="0"/>
-                <a:buChar char="•"/>
-              </a:pPr>
+              <a:br>
+                <a:rPr lang="en-US" altLang="ja-JP" sz="2000" b="0" i="0">
+                  <a:solidFill>
+                    <a:schemeClr val="tx1"/>
+                  </a:solidFill>
+                  <a:effectLst/>
+                  <a:latin typeface="Söhne"/>
+                </a:rPr>
+              </a:br>
+              <a:r>
+                <a:rPr kumimoji="1" lang="en-US" altLang="ja-JP" sz="2000">
+                  <a:solidFill>
+                    <a:schemeClr val="tx1"/>
+                  </a:solidFill>
+                </a:rPr>
+                <a:t>e</a:t>
+              </a:r>
               <a:r>
                 <a:rPr kumimoji="1" lang="en-US" altLang="ja-JP" sz="2000" dirty="0">
                   <a:solidFill>
                     <a:schemeClr val="tx1"/>
                   </a:solidFill>
                 </a:rPr>
-                <a:t>e.g. Minting Site, DEX and Fully On-chain site.</a:t>
+                <a:t>.g. Minting Site, DEX and Fully On-chain site.</a:t>
               </a:r>
             </a:p>
             <a:p>
@@ -8022,6 +8043,41 @@
                   <a:effectLst/>
                   <a:latin typeface="Söhne"/>
                 </a:rPr>
+                <a:t>Total fees are higher, ranging 0.0014 - 0.02 SOL per transaction.</a:t>
+              </a:r>
+              <a:br>
+                <a:rPr lang="en-US" altLang="ja-JP" sz="2000" b="0" i="0" dirty="0">
+                  <a:solidFill>
+                    <a:schemeClr val="tx1"/>
+                  </a:solidFill>
+                  <a:effectLst/>
+                  <a:latin typeface="Söhne"/>
+                </a:rPr>
+              </a:br>
+              <a:r>
+                <a:rPr lang="en-US" altLang="ja-JP" sz="2000" b="0" i="0" dirty="0">
+                  <a:solidFill>
+                    <a:schemeClr val="tx1"/>
+                  </a:solidFill>
+                  <a:effectLst/>
+                  <a:latin typeface="Söhne"/>
+                </a:rPr>
+                <a:t>e.g. 10K mints are up to 200 SOL</a:t>
+              </a:r>
+            </a:p>
+            <a:p>
+              <a:pPr marL="285750" indent="-285750">
+                <a:buFont typeface="Arial" panose="020B0604020202020204" pitchFamily="34" charset="0"/>
+                <a:buChar char="•"/>
+              </a:pPr>
+              <a:r>
+                <a:rPr lang="en-US" altLang="ja-JP" sz="2000" b="0" i="0" dirty="0">
+                  <a:solidFill>
+                    <a:schemeClr val="tx1"/>
+                  </a:solidFill>
+                  <a:effectLst/>
+                  <a:latin typeface="Söhne"/>
+                </a:rPr>
                 <a:t>(Option) You may need to build a</a:t>
               </a:r>
               <a:r>
@@ -8085,9 +8141,8 @@
             <a:pPr algn="r"/>
             <a:r>
               <a:rPr kumimoji="1" lang="en-US" altLang="ja-JP" sz="1200" dirty="0"/>
-              <a:t>JST May 28 2023</a:t>
-            </a:r>
-            <a:endParaRPr kumimoji="1" lang="ja-JP" altLang="en-US" sz="1200" dirty="0"/>
+              <a:t>JST Jun 12 2023</a:t>
+            </a:r>
           </a:p>
         </p:txBody>
       </p:sp>

</xml_diff>